<commit_message>
adding a slide with a table
</commit_message>
<xml_diff>
--- a/ppt-files/chart-01.pptx
+++ b/ppt-files/chart-01.pptx
@@ -6,6 +6,7 @@
   </p:sldMasterIdLst>
   <p:sldIdLst>
     <p:sldId r:id="rId7" id="256"/>
+    <p:sldId r:id="rId8" id="257"/>
   </p:sldIdLst>
   <p:sldSz cx="9144000" cy="6858000" type="screen4x3"/>
   <p:notesSz cx="6858000" cy="9144000"/>
@@ -153,7 +154,7 @@
                 <c:formatCode>General</c:formatCode>
                 <c:ptCount val="3"/>
                 <c:pt idx="0">
-                  <c:v>19.2</c:v>
+                  <c:v>50.0</c:v>
                 </c:pt>
                 <c:pt idx="1">
                   <c:v>21.4</c:v>
@@ -3211,7 +3212,11 @@
         <p:txBody>
           <a:bodyPr/>
           <a:lstStyle/>
-          <a:p/>
+          <a:p>
+            <a:r>
+              <a:t>Adding a Chart</a:t>
+            </a:r>
+          </a:p>
         </p:txBody>
       </p:sp>
       <p:graphicFrame>
@@ -3229,6 +3234,123 @@
         <a:graphic>
           <a:graphicData uri="http://schemas.openxmlformats.org/drawingml/2006/chart">
             <c:chart xmlns:c="http://schemas.openxmlformats.org/drawingml/2006/chart" r:id="rId2"/>
+          </a:graphicData>
+        </a:graphic>
+      </p:graphicFrame>
+    </p:spTree>
+  </p:cSld>
+  <p:clrMapOvr>
+    <a:masterClrMapping/>
+  </p:clrMapOvr>
+</p:sld>
+</file>
+
+<file path=ppt/slides/slide2.xml><?xml version="1.0" encoding="utf-8"?>
+<p:sld xmlns:a="http://schemas.openxmlformats.org/drawingml/2006/main" xmlns:p="http://schemas.openxmlformats.org/presentationml/2006/main" xmlns:r="http://schemas.openxmlformats.org/officeDocument/2006/relationships">
+  <p:cSld>
+    <p:spTree>
+      <p:nvGrpSpPr>
+        <p:cNvPr id="1" name=""/>
+        <p:cNvGrpSpPr/>
+        <p:nvPr/>
+      </p:nvGrpSpPr>
+      <p:grpSpPr/>
+      <p:sp>
+        <p:nvSpPr>
+          <p:cNvPr id="2" name="Title 1"/>
+          <p:cNvSpPr>
+            <a:spLocks noGrp="1"/>
+          </p:cNvSpPr>
+          <p:nvPr>
+            <p:ph type="title"/>
+          </p:nvPr>
+        </p:nvSpPr>
+        <p:spPr/>
+        <p:txBody>
+          <a:bodyPr/>
+          <a:lstStyle/>
+          <a:p>
+            <a:r>
+              <a:t>Adding a Table</a:t>
+            </a:r>
+          </a:p>
+        </p:txBody>
+      </p:sp>
+      <p:graphicFrame>
+        <p:nvGraphicFramePr>
+          <p:cNvPr id="3" name="Table 2"/>
+          <p:cNvGraphicFramePr>
+            <a:graphicFrameLocks noGrp="1"/>
+          </p:cNvGraphicFramePr>
+          <p:nvPr/>
+        </p:nvGraphicFramePr>
+        <p:xfrm>
+          <a:off x="1828800" y="1828800"/>
+          <a:ext cx="5486400" cy="731520"/>
+        </p:xfrm>
+        <a:graphic>
+          <a:graphicData uri="http://schemas.openxmlformats.org/drawingml/2006/table">
+            <a:tbl>
+              <a:tblPr firstRow="1" bandRow="1">
+                <a:tableStyleId>{5C22544A-7EE6-4342-B048-85BDC9FD1C3A}</a:tableStyleId>
+              </a:tblPr>
+              <a:tblGrid>
+                <a:gridCol w="1828800"/>
+                <a:gridCol w="3657600"/>
+              </a:tblGrid>
+              <a:tr h="365760">
+                <a:tc>
+                  <a:txBody>
+                    <a:bodyPr/>
+                    <a:lstStyle/>
+                    <a:p>
+                      <a:r>
+                        <a:t>Foo</a:t>
+                      </a:r>
+                    </a:p>
+                  </a:txBody>
+                  <a:tcPr/>
+                </a:tc>
+                <a:tc>
+                  <a:txBody>
+                    <a:bodyPr/>
+                    <a:lstStyle/>
+                    <a:p>
+                      <a:r>
+                        <a:t>Bar</a:t>
+                      </a:r>
+                    </a:p>
+                  </a:txBody>
+                  <a:tcPr/>
+                </a:tc>
+              </a:tr>
+              <a:tr h="365760">
+                <a:tc>
+                  <a:txBody>
+                    <a:bodyPr/>
+                    <a:lstStyle/>
+                    <a:p>
+                      <a:r>
+                        <a:t>Baz</a:t>
+                      </a:r>
+                    </a:p>
+                  </a:txBody>
+                  <a:tcPr/>
+                </a:tc>
+                <a:tc>
+                  <a:txBody>
+                    <a:bodyPr/>
+                    <a:lstStyle/>
+                    <a:p>
+                      <a:r>
+                        <a:t>Qux</a:t>
+                      </a:r>
+                    </a:p>
+                  </a:txBody>
+                  <a:tcPr/>
+                </a:tc>
+              </a:tr>
+            </a:tbl>
           </a:graphicData>
         </a:graphic>
       </p:graphicFrame>

</xml_diff>